<commit_message>
Gantt-Diagramm erster Entwurf. Kleine Ergänzugen an Präsi
</commit_message>
<xml_diff>
--- a/Geschaeftsvorschlag_Smart_Home_Dashboard.pptx
+++ b/Geschaeftsvorschlag_Smart_Home_Dashboard.pptx
@@ -121,7 +121,44 @@
       </a:defRPr>
     </a:lvl9pPr>
   </p:defaultTextStyle>
+  <p:extLst>
+    <p:ext uri="{EFAFB233-063F-42B5-8137-9DF3F51BA10A}">
+      <p15:sldGuideLst xmlns:p15="http://schemas.microsoft.com/office/powerpoint/2012/main"/>
+    </p:ext>
+    <p:ext uri="{2D200454-40CA-4A62-9FC3-DE9A4176ACB9}">
+      <p15:notesGuideLst xmlns:p15="http://schemas.microsoft.com/office/powerpoint/2012/main"/>
+    </p:ext>
+  </p:extLst>
 </p:presentation>
+</file>
+
+<file path=ppt/changesInfos/changesInfo1.xml><?xml version="1.0" encoding="utf-8"?>
+<pc:chgInfo xmlns:a="http://schemas.openxmlformats.org/drawingml/2006/main" xmlns:r="http://schemas.openxmlformats.org/officeDocument/2006/relationships" xmlns:ac="http://schemas.microsoft.com/office/drawing/2013/main/command" xmlns:pc="http://schemas.microsoft.com/office/powerpoint/2013/main/command">
+  <pc:docChgLst>
+    <pc:chgData name="Lena Retter" userId="e99a5d270cf77d30" providerId="LiveId" clId="{030FF4FC-573C-42D7-937F-868FA982C512}"/>
+    <pc:docChg chg="custSel modSld">
+      <pc:chgData name="Lena Retter" userId="e99a5d270cf77d30" providerId="LiveId" clId="{030FF4FC-573C-42D7-937F-868FA982C512}" dt="2025-10-18T14:31:36.018" v="57" actId="20577"/>
+      <pc:docMkLst>
+        <pc:docMk/>
+      </pc:docMkLst>
+      <pc:sldChg chg="modSp mod">
+        <pc:chgData name="Lena Retter" userId="e99a5d270cf77d30" providerId="LiveId" clId="{030FF4FC-573C-42D7-937F-868FA982C512}" dt="2025-10-18T14:31:36.018" v="57" actId="20577"/>
+        <pc:sldMkLst>
+          <pc:docMk/>
+          <pc:sldMk cId="1723472046" sldId="264"/>
+        </pc:sldMkLst>
+        <pc:spChg chg="mod">
+          <ac:chgData name="Lena Retter" userId="e99a5d270cf77d30" providerId="LiveId" clId="{030FF4FC-573C-42D7-937F-868FA982C512}" dt="2025-10-18T14:31:36.018" v="57" actId="20577"/>
+          <ac:spMkLst>
+            <pc:docMk/>
+            <pc:sldMk cId="1723472046" sldId="264"/>
+            <ac:spMk id="3" creationId="{5861C095-10B8-B146-EAC0-0129774B54F1}"/>
+          </ac:spMkLst>
+        </pc:spChg>
+      </pc:sldChg>
+    </pc:docChg>
+  </pc:docChgLst>
+</pc:chgInfo>
 </file>
 
 <file path=ppt/handoutMasters/handoutMaster1.xml><?xml version="1.0" encoding="utf-8"?>
@@ -218,7 +255,7 @@
           <a:p>
             <a:fld id="{73EC6B94-5741-46C0-B547-6C8ED1827195}" type="datetimeFigureOut">
               <a:rPr lang="de-DE" smtClean="0"/>
-              <a:t>15.10.2025</a:t>
+              <a:t>18.10.2025</a:t>
             </a:fld>
             <a:endParaRPr lang="de-DE"/>
           </a:p>
@@ -395,7 +432,7 @@
           <a:p>
             <a:fld id="{EC24D3E6-6730-4956-A114-3164E1E0B830}" type="datetimeFigureOut">
               <a:rPr lang="de-DE" smtClean="0"/>
-              <a:t>15.10.2025</a:t>
+              <a:t>18.10.2025</a:t>
             </a:fld>
             <a:endParaRPr lang="de-DE"/>
           </a:p>
@@ -809,7 +846,7 @@
           <a:p>
             <a:fld id="{98B6722A-D101-43EA-A4F8-E92271585101}" type="datetime1">
               <a:rPr lang="de-DE" smtClean="0"/>
-              <a:t>15.10.2025</a:t>
+              <a:t>18.10.2025</a:t>
             </a:fld>
             <a:endParaRPr lang="de-DE"/>
           </a:p>
@@ -1015,7 +1052,7 @@
           <a:p>
             <a:fld id="{20FB06FC-6F17-4259-9E40-8BE26827AA22}" type="datetime1">
               <a:rPr lang="de-DE" smtClean="0"/>
-              <a:t>15.10.2025</a:t>
+              <a:t>18.10.2025</a:t>
             </a:fld>
             <a:endParaRPr lang="de-DE"/>
           </a:p>
@@ -1231,7 +1268,7 @@
           <a:p>
             <a:fld id="{F0D48CA1-1949-4C07-849E-D9A9E9CED9B5}" type="datetime1">
               <a:rPr lang="de-DE" smtClean="0"/>
-              <a:t>15.10.2025</a:t>
+              <a:t>18.10.2025</a:t>
             </a:fld>
             <a:endParaRPr lang="de-DE"/>
           </a:p>
@@ -1437,7 +1474,7 @@
           <a:p>
             <a:fld id="{E53FFC2D-6797-4117-9A10-AF9D7BFA6B25}" type="datetime1">
               <a:rPr lang="de-DE" smtClean="0"/>
-              <a:t>15.10.2025</a:t>
+              <a:t>18.10.2025</a:t>
             </a:fld>
             <a:endParaRPr lang="de-DE"/>
           </a:p>
@@ -1720,7 +1757,7 @@
           <a:p>
             <a:fld id="{5232EB74-3201-4BAE-A0D7-D2F697D89183}" type="datetime1">
               <a:rPr lang="de-DE" smtClean="0"/>
-              <a:t>15.10.2025</a:t>
+              <a:t>18.10.2025</a:t>
             </a:fld>
             <a:endParaRPr lang="de-DE"/>
           </a:p>
@@ -1993,7 +2030,7 @@
           <a:p>
             <a:fld id="{86896984-511D-4D1E-B836-1BC6118B8184}" type="datetime1">
               <a:rPr lang="de-DE" smtClean="0"/>
-              <a:t>15.10.2025</a:t>
+              <a:t>18.10.2025</a:t>
             </a:fld>
             <a:endParaRPr lang="de-DE"/>
           </a:p>
@@ -2413,7 +2450,7 @@
           <a:p>
             <a:fld id="{1CF1F66E-A14A-4B3F-8E6C-4775500390F8}" type="datetime1">
               <a:rPr lang="de-DE" smtClean="0"/>
-              <a:t>15.10.2025</a:t>
+              <a:t>18.10.2025</a:t>
             </a:fld>
             <a:endParaRPr lang="de-DE"/>
           </a:p>
@@ -2562,7 +2599,7 @@
           <a:p>
             <a:fld id="{48E0408F-8435-4AEA-8B20-1FE74797E699}" type="datetime1">
               <a:rPr lang="de-DE" smtClean="0"/>
-              <a:t>15.10.2025</a:t>
+              <a:t>18.10.2025</a:t>
             </a:fld>
             <a:endParaRPr lang="de-DE"/>
           </a:p>
@@ -2683,7 +2720,7 @@
           <a:p>
             <a:fld id="{B7EA8AF9-CA0F-45F6-92EA-5D8A268BD918}" type="datetime1">
               <a:rPr lang="de-DE" smtClean="0"/>
-              <a:t>15.10.2025</a:t>
+              <a:t>18.10.2025</a:t>
             </a:fld>
             <a:endParaRPr lang="de-DE"/>
           </a:p>
@@ -3002,7 +3039,7 @@
           <a:p>
             <a:fld id="{240A95BA-4E0D-430A-9D82-798F91C316CB}" type="datetime1">
               <a:rPr lang="de-DE" smtClean="0"/>
-              <a:t>15.10.2025</a:t>
+              <a:t>18.10.2025</a:t>
             </a:fld>
             <a:endParaRPr lang="de-DE"/>
           </a:p>
@@ -3298,7 +3335,7 @@
           <a:p>
             <a:fld id="{90E855E4-DF2A-41BE-A65F-F588A35C2225}" type="datetime1">
               <a:rPr lang="de-DE" smtClean="0"/>
-              <a:t>15.10.2025</a:t>
+              <a:t>18.10.2025</a:t>
             </a:fld>
             <a:endParaRPr lang="de-DE"/>
           </a:p>
@@ -3547,7 +3584,7 @@
           <a:p>
             <a:fld id="{3F4AEB0C-29A1-451D-9AB7-7854EE98B2A1}" type="datetime1">
               <a:rPr lang="de-DE" smtClean="0"/>
-              <a:t>15.10.2025</a:t>
+              <a:t>18.10.2025</a:t>
             </a:fld>
             <a:endParaRPr lang="de-DE" dirty="0"/>
           </a:p>
@@ -4099,7 +4136,7 @@
           <a:p>
             <a:fld id="{EA3426B1-18EB-40E2-B5E9-A32DAF22A91A}" type="datetime1">
               <a:rPr lang="de-DE" smtClean="0"/>
-              <a:t>15.10.2025</a:t>
+              <a:t>18.10.2025</a:t>
             </a:fld>
             <a:endParaRPr lang="de-DE"/>
           </a:p>
@@ -4214,7 +4251,7 @@
           <a:p>
             <a:fld id="{E53FFC2D-6797-4117-9A10-AF9D7BFA6B25}" type="datetime1">
               <a:rPr lang="de-DE" smtClean="0"/>
-              <a:t>15.10.2025</a:t>
+              <a:t>18.10.2025</a:t>
             </a:fld>
             <a:endParaRPr lang="de-DE"/>
           </a:p>
@@ -4356,7 +4393,7 @@
           <a:p>
             <a:fld id="{E53FFC2D-6797-4117-9A10-AF9D7BFA6B25}" type="datetime1">
               <a:rPr lang="de-DE" smtClean="0"/>
-              <a:t>15.10.2025</a:t>
+              <a:t>18.10.2025</a:t>
             </a:fld>
             <a:endParaRPr lang="de-DE"/>
           </a:p>
@@ -4468,7 +4505,7 @@
           <a:p>
             <a:fld id="{E53FFC2D-6797-4117-9A10-AF9D7BFA6B25}" type="datetime1">
               <a:rPr lang="de-DE" smtClean="0"/>
-              <a:t>15.10.2025</a:t>
+              <a:t>18.10.2025</a:t>
             </a:fld>
             <a:endParaRPr lang="de-DE"/>
           </a:p>
@@ -4670,7 +4707,7 @@
           <a:p>
             <a:fld id="{B855ED93-D8D4-40F4-A911-0E31CD0DC399}" type="datetime1">
               <a:rPr lang="de-DE" smtClean="0"/>
-              <a:t>15.10.2025</a:t>
+              <a:t>18.10.2025</a:t>
             </a:fld>
             <a:endParaRPr lang="de-DE"/>
           </a:p>
@@ -4789,7 +4826,7 @@
           <a:p>
             <a:fld id="{E53FFC2D-6797-4117-9A10-AF9D7BFA6B25}" type="datetime1">
               <a:rPr lang="de-DE" smtClean="0"/>
-              <a:t>15.10.2025</a:t>
+              <a:t>18.10.2025</a:t>
             </a:fld>
             <a:endParaRPr lang="de-DE"/>
           </a:p>
@@ -5295,7 +5332,7 @@
           <a:p>
             <a:fld id="{E53FFC2D-6797-4117-9A10-AF9D7BFA6B25}" type="datetime1">
               <a:rPr lang="de-DE" smtClean="0"/>
-              <a:t>15.10.2025</a:t>
+              <a:t>18.10.2025</a:t>
             </a:fld>
             <a:endParaRPr lang="de-DE"/>
           </a:p>
@@ -5441,7 +5478,7 @@
             <a:fld id="{E53FFC2D-6797-4117-9A10-AF9D7BFA6B25}" type="datetime1">
               <a:rPr lang="de-DE" smtClean="0"/>
               <a:pPr/>
-              <a:t>15.10.2025</a:t>
+              <a:t>18.10.2025</a:t>
             </a:fld>
             <a:endParaRPr lang="de-DE"/>
           </a:p>
@@ -5577,7 +5614,7 @@
           <a:p>
             <a:fld id="{E53FFC2D-6797-4117-9A10-AF9D7BFA6B25}" type="datetime1">
               <a:rPr lang="de-DE" smtClean="0"/>
-              <a:t>15.10.2025</a:t>
+              <a:t>18.10.2025</a:t>
             </a:fld>
             <a:endParaRPr lang="de-DE"/>
           </a:p>
@@ -5713,7 +5750,7 @@
           <a:p>
             <a:fld id="{E53FFC2D-6797-4117-9A10-AF9D7BFA6B25}" type="datetime1">
               <a:rPr lang="de-DE" smtClean="0"/>
-              <a:t>15.10.2025</a:t>
+              <a:t>18.10.2025</a:t>
             </a:fld>
             <a:endParaRPr lang="de-DE"/>
           </a:p>
@@ -5893,7 +5930,7 @@
           <a:p>
             <a:fld id="{E53FFC2D-6797-4117-9A10-AF9D7BFA6B25}" type="datetime1">
               <a:rPr lang="de-DE" smtClean="0"/>
-              <a:t>15.10.2025</a:t>
+              <a:t>18.10.2025</a:t>
             </a:fld>
             <a:endParaRPr lang="de-DE"/>
           </a:p>
@@ -6015,7 +6052,18 @@
               <a:rPr lang="de-DE" sz="1600" dirty="0" err="1"/>
               <a:t>jQuery</a:t>
             </a:r>
-            <a:endParaRPr lang="de-DE" sz="1600" dirty="0"/>
+            <a:r>
+              <a:rPr lang="de-DE" sz="1600" dirty="0"/>
+              <a:t>, </a:t>
+            </a:r>
+            <a:r>
+              <a:rPr lang="de-DE" sz="1600" dirty="0" err="1"/>
+              <a:t>Dbeaver</a:t>
+            </a:r>
+            <a:r>
+              <a:rPr lang="de-DE" sz="1600" dirty="0"/>
+              <a:t>, SQLite</a:t>
+            </a:r>
           </a:p>
           <a:p>
             <a:pPr lvl="1"/>
@@ -6042,6 +6090,18 @@
             <a:pPr lvl="1"/>
             <a:r>
               <a:rPr lang="de-DE" sz="1600" dirty="0"/>
+              <a:t>SQLite-Daten anpassen</a:t>
+            </a:r>
+            <a:r>
+              <a:rPr lang="de-DE" sz="1600"/>
+              <a:t>/ ergänzen</a:t>
+            </a:r>
+            <a:endParaRPr lang="de-DE" sz="1600" dirty="0"/>
+          </a:p>
+          <a:p>
+            <a:pPr lvl="1"/>
+            <a:r>
+              <a:rPr lang="de-DE" sz="1600" dirty="0"/>
               <a:t>Responsive Design</a:t>
             </a:r>
           </a:p>
@@ -6070,7 +6130,7 @@
           <a:p>
             <a:fld id="{E53FFC2D-6797-4117-9A10-AF9D7BFA6B25}" type="datetime1">
               <a:rPr lang="de-DE" smtClean="0"/>
-              <a:t>15.10.2025</a:t>
+              <a:t>18.10.2025</a:t>
             </a:fld>
             <a:endParaRPr lang="de-DE"/>
           </a:p>

</xml_diff>